<commit_message>
Popravljena predstavitev za IP
Change-Id: I92d6be517bc9ea9e61951626bf5f967f7be064a1
</commit_message>
<xml_diff>
--- a/predstavitve/IntegracijskoProgramiranje/brezskrbnik_predstavitevIP.pptx
+++ b/predstavitve/IntegracijskoProgramiranje/brezskrbnik_predstavitevIP.pptx
@@ -19,8 +19,9 @@
     <p:sldId id="266" r:id="rId13"/>
     <p:sldId id="267" r:id="rId14"/>
     <p:sldId id="268" r:id="rId15"/>
-    <p:sldId id="269" r:id="rId16"/>
-    <p:sldId id="272" r:id="rId17"/>
+    <p:sldId id="274" r:id="rId16"/>
+    <p:sldId id="269" r:id="rId17"/>
+    <p:sldId id="272" r:id="rId18"/>
   </p:sldIdLst>
   <p:sldSz cx="9144000" cy="6858000" type="screen4x3"/>
   <p:notesSz cx="6858000" cy="9144000"/>
@@ -138,6 +139,7 @@
             <p14:sldId id="266"/>
             <p14:sldId id="267"/>
             <p14:sldId id="268"/>
+            <p14:sldId id="274"/>
             <p14:sldId id="269"/>
             <p14:sldId id="272"/>
           </p14:sldIdLst>
@@ -285,7 +287,7 @@
           <a:p>
             <a:fld id="{B8FD165B-AD51-4D1A-850B-16B0EAAA5D4D}" type="datetimeFigureOut">
               <a:rPr lang="sl-SI" smtClean="0"/>
-              <a:t>10.1.2012</a:t>
+              <a:t>16.1.2012</a:t>
             </a:fld>
             <a:endParaRPr lang="sl-SI"/>
           </a:p>
@@ -1154,7 +1156,7 @@
           <a:p>
             <a:fld id="{B8FD165B-AD51-4D1A-850B-16B0EAAA5D4D}" type="datetimeFigureOut">
               <a:rPr lang="sl-SI" smtClean="0"/>
-              <a:t>10.1.2012</a:t>
+              <a:t>16.1.2012</a:t>
             </a:fld>
             <a:endParaRPr lang="sl-SI"/>
           </a:p>
@@ -1329,7 +1331,7 @@
           <a:p>
             <a:fld id="{B8FD165B-AD51-4D1A-850B-16B0EAAA5D4D}" type="datetimeFigureOut">
               <a:rPr lang="sl-SI" smtClean="0"/>
-              <a:t>10.1.2012</a:t>
+              <a:t>16.1.2012</a:t>
             </a:fld>
             <a:endParaRPr lang="sl-SI"/>
           </a:p>
@@ -1499,7 +1501,7 @@
           <a:p>
             <a:fld id="{B8FD165B-AD51-4D1A-850B-16B0EAAA5D4D}" type="datetimeFigureOut">
               <a:rPr lang="sl-SI" smtClean="0"/>
-              <a:t>10.1.2012</a:t>
+              <a:t>16.1.2012</a:t>
             </a:fld>
             <a:endParaRPr lang="sl-SI"/>
           </a:p>
@@ -1709,7 +1711,7 @@
           <a:p>
             <a:fld id="{B8FD165B-AD51-4D1A-850B-16B0EAAA5D4D}" type="datetimeFigureOut">
               <a:rPr lang="sl-SI" smtClean="0"/>
-              <a:t>10.1.2012</a:t>
+              <a:t>16.1.2012</a:t>
             </a:fld>
             <a:endParaRPr lang="sl-SI"/>
           </a:p>
@@ -2523,7 +2525,7 @@
           <a:p>
             <a:fld id="{B8FD165B-AD51-4D1A-850B-16B0EAAA5D4D}" type="datetimeFigureOut">
               <a:rPr lang="sl-SI" smtClean="0"/>
-              <a:t>10.1.2012</a:t>
+              <a:t>16.1.2012</a:t>
             </a:fld>
             <a:endParaRPr lang="sl-SI"/>
           </a:p>
@@ -2759,7 +2761,7 @@
           <a:p>
             <a:fld id="{B8FD165B-AD51-4D1A-850B-16B0EAAA5D4D}" type="datetimeFigureOut">
               <a:rPr lang="sl-SI" smtClean="0"/>
-              <a:t>10.1.2012</a:t>
+              <a:t>16.1.2012</a:t>
             </a:fld>
             <a:endParaRPr lang="sl-SI"/>
           </a:p>
@@ -3082,7 +3084,7 @@
           <a:p>
             <a:fld id="{B8FD165B-AD51-4D1A-850B-16B0EAAA5D4D}" type="datetimeFigureOut">
               <a:rPr lang="sl-SI" smtClean="0"/>
-              <a:t>10.1.2012</a:t>
+              <a:t>16.1.2012</a:t>
             </a:fld>
             <a:endParaRPr lang="sl-SI"/>
           </a:p>
@@ -3172,7 +3174,7 @@
           <a:p>
             <a:fld id="{B8FD165B-AD51-4D1A-850B-16B0EAAA5D4D}" type="datetimeFigureOut">
               <a:rPr lang="sl-SI" smtClean="0"/>
-              <a:t>10.1.2012</a:t>
+              <a:t>16.1.2012</a:t>
             </a:fld>
             <a:endParaRPr lang="sl-SI"/>
           </a:p>
@@ -3689,7 +3691,7 @@
           <a:p>
             <a:fld id="{B8FD165B-AD51-4D1A-850B-16B0EAAA5D4D}" type="datetimeFigureOut">
               <a:rPr lang="sl-SI" smtClean="0"/>
-              <a:t>10.1.2012</a:t>
+              <a:t>16.1.2012</a:t>
             </a:fld>
             <a:endParaRPr lang="sl-SI"/>
           </a:p>
@@ -4200,7 +4202,7 @@
           <a:p>
             <a:fld id="{B8FD165B-AD51-4D1A-850B-16B0EAAA5D4D}" type="datetimeFigureOut">
               <a:rPr lang="sl-SI" smtClean="0"/>
-              <a:t>10.1.2012</a:t>
+              <a:t>16.1.2012</a:t>
             </a:fld>
             <a:endParaRPr lang="sl-SI"/>
           </a:p>
@@ -4445,7 +4447,7 @@
           <a:p>
             <a:fld id="{B8FD165B-AD51-4D1A-850B-16B0EAAA5D4D}" type="datetimeFigureOut">
               <a:rPr lang="sl-SI" smtClean="0"/>
-              <a:t>10.1.2012</a:t>
+              <a:t>16.1.2012</a:t>
             </a:fld>
             <a:endParaRPr lang="sl-SI"/>
           </a:p>
@@ -5143,15 +5145,7 @@
           <a:p>
             <a:r>
               <a:rPr lang="sl-SI" dirty="0" smtClean="0"/>
-              <a:t>Predstavitev delovanja </a:t>
-            </a:r>
-            <a:r>
-              <a:rPr lang="sl-SI" dirty="0" smtClean="0"/>
-              <a:t>spletne storitve pri </a:t>
-            </a:r>
-            <a:r>
-              <a:rPr lang="sl-SI" dirty="0" smtClean="0"/>
-              <a:t>predmetu Integracijsko programiranje</a:t>
+              <a:t>Predstavitev delovanja spletne storitve pri predmetu Integracijsko programiranje</a:t>
             </a:r>
           </a:p>
           <a:p>
@@ -5674,9 +5668,40 @@
           </a:p>
         </p:txBody>
       </p:sp>
+      <p:sp>
+        <p:nvSpPr>
+          <p:cNvPr id="4" name="PoljeZBesedilom 3"/>
+          <p:cNvSpPr txBox="1"/>
+          <p:nvPr/>
+        </p:nvSpPr>
+        <p:spPr>
+          <a:xfrm>
+            <a:off x="2699792" y="5589240"/>
+            <a:ext cx="2808312" cy="646331"/>
+          </a:xfrm>
+          <a:prstGeom prst="rect">
+            <a:avLst/>
+          </a:prstGeom>
+          <a:noFill/>
+        </p:spPr>
+        <p:txBody>
+          <a:bodyPr wrap="square" rtlCol="0">
+            <a:spAutoFit/>
+          </a:bodyPr>
+          <a:lstStyle/>
+          <a:p>
+            <a:pPr algn="ctr"/>
+            <a:r>
+              <a:rPr lang="sl-SI" dirty="0" smtClean="0"/>
+              <a:t>Izberemo čas in kliknemo vključi budilko</a:t>
+            </a:r>
+            <a:endParaRPr lang="sl-SI" dirty="0"/>
+          </a:p>
+        </p:txBody>
+      </p:sp>
       <p:pic>
         <p:nvPicPr>
-          <p:cNvPr id="4098" name="Picture 2" descr="G:\DCIM\Screenshots\screenshot-1324848615141.png"/>
+          <p:cNvPr id="2050" name="Picture 2" descr="C:\Dokumenti\FERI2011\Poletje\ProgramskiJeziki\Projekt-brezskrbnik\device-2012-01-16-172154.png"/>
           <p:cNvPicPr>
             <a:picLocks noChangeAspect="1" noChangeArrowheads="1"/>
           </p:cNvPicPr>
@@ -5697,8 +5722,8 @@
         </p:blipFill>
         <p:spPr bwMode="auto">
           <a:xfrm>
-            <a:off x="2771800" y="1556792"/>
-            <a:ext cx="2664296" cy="3996444"/>
+            <a:off x="2963614" y="1741065"/>
+            <a:ext cx="2565450" cy="3848175"/>
           </a:xfrm>
           <a:prstGeom prst="rect">
             <a:avLst/>
@@ -5715,37 +5740,6 @@
           </a:extLst>
         </p:spPr>
       </p:pic>
-      <p:sp>
-        <p:nvSpPr>
-          <p:cNvPr id="4" name="PoljeZBesedilom 3"/>
-          <p:cNvSpPr txBox="1"/>
-          <p:nvPr/>
-        </p:nvSpPr>
-        <p:spPr>
-          <a:xfrm>
-            <a:off x="2699792" y="5589240"/>
-            <a:ext cx="2808312" cy="646331"/>
-          </a:xfrm>
-          <a:prstGeom prst="rect">
-            <a:avLst/>
-          </a:prstGeom>
-          <a:noFill/>
-        </p:spPr>
-        <p:txBody>
-          <a:bodyPr wrap="square" rtlCol="0">
-            <a:spAutoFit/>
-          </a:bodyPr>
-          <a:lstStyle/>
-          <a:p>
-            <a:pPr algn="ctr"/>
-            <a:r>
-              <a:rPr lang="sl-SI" dirty="0" smtClean="0"/>
-              <a:t>Izberemo čas in kliknemo vključi budilko</a:t>
-            </a:r>
-            <a:endParaRPr lang="sl-SI" dirty="0"/>
-          </a:p>
-        </p:txBody>
-      </p:sp>
     </p:spTree>
     <p:extLst>
       <p:ext uri="{BB962C8B-B14F-4D97-AF65-F5344CB8AC3E}">
@@ -5805,9 +5799,40 @@
           </a:p>
         </p:txBody>
       </p:sp>
+      <p:sp>
+        <p:nvSpPr>
+          <p:cNvPr id="4" name="PoljeZBesedilom 3"/>
+          <p:cNvSpPr txBox="1"/>
+          <p:nvPr/>
+        </p:nvSpPr>
+        <p:spPr>
+          <a:xfrm>
+            <a:off x="1475656" y="5589240"/>
+            <a:ext cx="5544616" cy="923330"/>
+          </a:xfrm>
+          <a:prstGeom prst="rect">
+            <a:avLst/>
+          </a:prstGeom>
+          <a:noFill/>
+        </p:spPr>
+        <p:txBody>
+          <a:bodyPr wrap="square" rtlCol="0">
+            <a:spAutoFit/>
+          </a:bodyPr>
+          <a:lstStyle/>
+          <a:p>
+            <a:pPr algn="ctr"/>
+            <a:r>
+              <a:rPr lang="sl-SI" dirty="0" smtClean="0"/>
+              <a:t>Vremenska napoved (prevedena) in možnost odločitve (če je vreme lepo bo bolj viden gumb „Da“ in obratno).</a:t>
+            </a:r>
+            <a:endParaRPr lang="sl-SI" dirty="0"/>
+          </a:p>
+        </p:txBody>
+      </p:sp>
       <p:pic>
         <p:nvPicPr>
-          <p:cNvPr id="5122" name="Picture 2" descr="G:\DCIM\Screenshots\screenshot-1324848626113.png"/>
+          <p:cNvPr id="1026" name="Picture 2" descr="G:\DCIM\Screenshots\screenshot-1326730785210.png"/>
           <p:cNvPicPr>
             <a:picLocks noChangeAspect="1" noChangeArrowheads="1"/>
           </p:cNvPicPr>
@@ -5828,8 +5853,8 @@
         </p:blipFill>
         <p:spPr bwMode="auto">
           <a:xfrm>
-            <a:off x="2771800" y="1556792"/>
-            <a:ext cx="2711963" cy="4067944"/>
+            <a:off x="2843808" y="1556792"/>
+            <a:ext cx="2504513" cy="3756769"/>
           </a:xfrm>
           <a:prstGeom prst="rect">
             <a:avLst/>
@@ -5846,37 +5871,6 @@
           </a:extLst>
         </p:spPr>
       </p:pic>
-      <p:sp>
-        <p:nvSpPr>
-          <p:cNvPr id="4" name="PoljeZBesedilom 3"/>
-          <p:cNvSpPr txBox="1"/>
-          <p:nvPr/>
-        </p:nvSpPr>
-        <p:spPr>
-          <a:xfrm>
-            <a:off x="1475656" y="5589240"/>
-            <a:ext cx="5544616" cy="923330"/>
-          </a:xfrm>
-          <a:prstGeom prst="rect">
-            <a:avLst/>
-          </a:prstGeom>
-          <a:noFill/>
-        </p:spPr>
-        <p:txBody>
-          <a:bodyPr wrap="square" rtlCol="0">
-            <a:spAutoFit/>
-          </a:bodyPr>
-          <a:lstStyle/>
-          <a:p>
-            <a:pPr algn="ctr"/>
-            <a:r>
-              <a:rPr lang="sl-SI" dirty="0" smtClean="0"/>
-              <a:t>Vremenska napoved (prevedena) in možnost odločitve (če je vreme lepo bo bolj viden gumb „Da“ in obratno).</a:t>
-            </a:r>
-            <a:endParaRPr lang="sl-SI" dirty="0"/>
-          </a:p>
-        </p:txBody>
-      </p:sp>
     </p:spTree>
     <p:extLst>
       <p:ext uri="{BB962C8B-B14F-4D97-AF65-F5344CB8AC3E}">
@@ -6061,6 +6055,129 @@
           <a:lstStyle/>
           <a:p>
             <a:r>
+              <a:rPr lang="sl-SI" dirty="0" smtClean="0"/>
+              <a:t>Android - Primer</a:t>
+            </a:r>
+            <a:endParaRPr lang="sl-SI" dirty="0"/>
+          </a:p>
+        </p:txBody>
+      </p:sp>
+      <p:pic>
+        <p:nvPicPr>
+          <p:cNvPr id="3074" name="Picture 2" descr="C:\Dokumenti\FERI2011\Poletje\ProgramskiJeziki\Projekt-brezskrbnik\device-2012-01-16-172154.png"/>
+          <p:cNvPicPr>
+            <a:picLocks noChangeAspect="1" noChangeArrowheads="1"/>
+          </p:cNvPicPr>
+          <p:nvPr/>
+        </p:nvPicPr>
+        <p:blipFill>
+          <a:blip r:embed="rId2">
+            <a:extLst>
+              <a:ext uri="{28A0092B-C50C-407E-A947-70E740481C1C}">
+                <a14:useLocalDpi xmlns:a14="http://schemas.microsoft.com/office/drawing/2010/main" val="0"/>
+              </a:ext>
+            </a:extLst>
+          </a:blip>
+          <a:srcRect/>
+          <a:stretch>
+            <a:fillRect/>
+          </a:stretch>
+        </p:blipFill>
+        <p:spPr bwMode="auto">
+          <a:xfrm>
+            <a:off x="2987824" y="1484784"/>
+            <a:ext cx="3048000" cy="4572000"/>
+          </a:xfrm>
+          <a:prstGeom prst="rect">
+            <a:avLst/>
+          </a:prstGeom>
+          <a:noFill/>
+          <a:extLst>
+            <a:ext uri="{909E8E84-426E-40DD-AFC4-6F175D3DCCD1}">
+              <a14:hiddenFill xmlns:a14="http://schemas.microsoft.com/office/drawing/2010/main">
+                <a:solidFill>
+                  <a:srgbClr val="FFFFFF"/>
+                </a:solidFill>
+              </a14:hiddenFill>
+            </a:ext>
+          </a:extLst>
+        </p:spPr>
+      </p:pic>
+      <p:sp>
+        <p:nvSpPr>
+          <p:cNvPr id="4" name="PoljeZBesedilom 3"/>
+          <p:cNvSpPr txBox="1"/>
+          <p:nvPr/>
+        </p:nvSpPr>
+        <p:spPr>
+          <a:xfrm>
+            <a:off x="3635896" y="6309320"/>
+            <a:ext cx="2736304" cy="369332"/>
+          </a:xfrm>
+          <a:prstGeom prst="rect">
+            <a:avLst/>
+          </a:prstGeom>
+          <a:noFill/>
+        </p:spPr>
+        <p:txBody>
+          <a:bodyPr wrap="square" rtlCol="0">
+            <a:spAutoFit/>
+          </a:bodyPr>
+          <a:lstStyle/>
+          <a:p>
+            <a:r>
+              <a:rPr lang="sl-SI" dirty="0" smtClean="0"/>
+              <a:t>Napredni meni</a:t>
+            </a:r>
+          </a:p>
+        </p:txBody>
+      </p:sp>
+    </p:spTree>
+    <p:extLst>
+      <p:ext uri="{BB962C8B-B14F-4D97-AF65-F5344CB8AC3E}">
+        <p14:creationId xmlns:p14="http://schemas.microsoft.com/office/powerpoint/2010/main" val="2082591240"/>
+      </p:ext>
+    </p:extLst>
+  </p:cSld>
+  <p:clrMapOvr>
+    <a:masterClrMapping/>
+  </p:clrMapOvr>
+</p:sld>
+</file>
+
+<file path=ppt/slides/slide16.xml><?xml version="1.0" encoding="utf-8"?>
+<p:sld xmlns:a="http://schemas.openxmlformats.org/drawingml/2006/main" xmlns:r="http://schemas.openxmlformats.org/officeDocument/2006/relationships" xmlns:p="http://schemas.openxmlformats.org/presentationml/2006/main">
+  <p:cSld>
+    <p:spTree>
+      <p:nvGrpSpPr>
+        <p:cNvPr id="1" name=""/>
+        <p:cNvGrpSpPr/>
+        <p:nvPr/>
+      </p:nvGrpSpPr>
+      <p:grpSpPr>
+        <a:xfrm>
+          <a:off x="0" y="0"/>
+          <a:ext cx="0" cy="0"/>
+          <a:chOff x="0" y="0"/>
+          <a:chExt cx="0" cy="0"/>
+        </a:xfrm>
+      </p:grpSpPr>
+      <p:sp>
+        <p:nvSpPr>
+          <p:cNvPr id="2" name="Naslov 1"/>
+          <p:cNvSpPr>
+            <a:spLocks noGrp="1"/>
+          </p:cNvSpPr>
+          <p:nvPr>
+            <p:ph type="title"/>
+          </p:nvPr>
+        </p:nvSpPr>
+        <p:spPr/>
+        <p:txBody>
+          <a:bodyPr/>
+          <a:lstStyle/>
+          <a:p>
+            <a:r>
               <a:rPr lang="sl-SI" dirty="0"/>
               <a:t>Android - Primer</a:t>
             </a:r>
@@ -6133,15 +6250,7 @@
             <a:pPr algn="ctr"/>
             <a:r>
               <a:rPr lang="sl-SI" dirty="0" smtClean="0"/>
-              <a:t>Primer neuspešnega klica </a:t>
-            </a:r>
-            <a:r>
-              <a:rPr lang="sl-SI" dirty="0" smtClean="0"/>
-              <a:t>spletne storitve (ni </a:t>
-            </a:r>
-            <a:r>
-              <a:rPr lang="sl-SI" dirty="0" smtClean="0"/>
-              <a:t>internetne povezave).</a:t>
+              <a:t>Primer neuspešnega klica spletne storitve (ni internetne povezave).</a:t>
             </a:r>
             <a:endParaRPr lang="sl-SI" dirty="0"/>
           </a:p>
@@ -6167,7 +6276,7 @@
 </p:sld>
 </file>
 
-<file path=ppt/slides/slide16.xml><?xml version="1.0" encoding="utf-8"?>
+<file path=ppt/slides/slide17.xml><?xml version="1.0" encoding="utf-8"?>
 <p:sld xmlns:a="http://schemas.openxmlformats.org/drawingml/2006/main" xmlns:r="http://schemas.openxmlformats.org/officeDocument/2006/relationships" xmlns:p="http://schemas.openxmlformats.org/presentationml/2006/main">
   <p:cSld>
     <p:spTree>
@@ -6320,13 +6429,8 @@
           <a:p>
             <a:r>
               <a:rPr lang="sl-SI" dirty="0" smtClean="0"/>
-              <a:t>Podatke </a:t>
-            </a:r>
-            <a:r>
-              <a:rPr lang="sl-SI" dirty="0" smtClean="0"/>
-              <a:t>razpoznati</a:t>
-            </a:r>
-            <a:endParaRPr lang="sl-SI" dirty="0" smtClean="0"/>
+              <a:t>Podatke razpoznati</a:t>
+            </a:r>
           </a:p>
           <a:p>
             <a:r>
@@ -6425,13 +6529,8 @@
           <a:p>
             <a:r>
               <a:rPr lang="sl-SI" dirty="0" smtClean="0"/>
-              <a:t>Vključevanje dodatnih knjižnic v </a:t>
-            </a:r>
-            <a:r>
-              <a:rPr lang="sl-SI" dirty="0" smtClean="0"/>
-              <a:t>spletno storitev</a:t>
-            </a:r>
-            <a:endParaRPr lang="sl-SI" dirty="0" smtClean="0"/>
+              <a:t>Vključevanje dodatnih knjižnic v spletno storitev</a:t>
+            </a:r>
           </a:p>
           <a:p>
             <a:r>
@@ -6662,12 +6761,8 @@
           <a:lstStyle/>
           <a:p>
             <a:r>
-              <a:rPr lang="sl-SI" dirty="0" err="1" smtClean="0"/>
-              <a:t>Web</a:t>
-            </a:r>
-            <a:r>
               <a:rPr lang="sl-SI" dirty="0" smtClean="0"/>
-              <a:t> servis</a:t>
+              <a:t>Spletna storitev</a:t>
             </a:r>
             <a:endParaRPr lang="sl-SI" dirty="0"/>
           </a:p>
@@ -6809,11 +6904,7 @@
           <a:p>
             <a:r>
               <a:rPr lang="sl-SI" dirty="0" smtClean="0"/>
-              <a:t>Spletna storitev – razpoznavanje </a:t>
-            </a:r>
-            <a:r>
-              <a:rPr lang="sl-SI" dirty="0" smtClean="0"/>
-              <a:t>1</a:t>
+              <a:t>Spletna storitev – razpoznavanje 1</a:t>
             </a:r>
             <a:endParaRPr lang="sl-SI" dirty="0"/>
           </a:p>
@@ -6836,15 +6927,7 @@
           <a:p>
             <a:r>
               <a:rPr lang="sl-SI" b="1" dirty="0" smtClean="0"/>
-              <a:t>V </a:t>
-            </a:r>
-            <a:r>
-              <a:rPr lang="sl-SI" b="1" dirty="0" smtClean="0"/>
-              <a:t>spletno storitev dobim </a:t>
-            </a:r>
-            <a:r>
-              <a:rPr lang="sl-SI" b="1" dirty="0" smtClean="0"/>
-              <a:t>kraj</a:t>
+              <a:t>V spletno storitev dobim kraj</a:t>
             </a:r>
           </a:p>
           <a:p>

</xml_diff>